<commit_message>
remove lecture 8, moved to OOP-2
</commit_message>
<xml_diff>
--- a/Лекции/ООП 1 лек 7.pptx
+++ b/Лекции/ООП 1 лек 7.pptx
@@ -5,7 +5,7 @@
     <p:sldMasterId id="2147483674" r:id="rId1"/>
   </p:sldMasterIdLst>
   <p:notesMasterIdLst>
-    <p:notesMasterId r:id="rId18"/>
+    <p:notesMasterId r:id="rId20"/>
   </p:notesMasterIdLst>
   <p:sldIdLst>
     <p:sldId id="273" r:id="rId2"/>
@@ -24,6 +24,8 @@
     <p:sldId id="286" r:id="rId15"/>
     <p:sldId id="287" r:id="rId16"/>
     <p:sldId id="288" r:id="rId17"/>
+    <p:sldId id="289" r:id="rId18"/>
+    <p:sldId id="290" r:id="rId19"/>
   </p:sldIdLst>
   <p:sldSz cx="12192000" cy="6858000"/>
   <p:notesSz cx="6858000" cy="9144000"/>
@@ -227,7 +229,7 @@
             <a:fld id="{AA2F9473-F066-431E-A6E8-1D478C995A6B}" type="datetimeFigureOut">
               <a:rPr lang="en-US" smtClean="0"/>
               <a:pPr/>
-              <a:t>5/2/2025</a:t>
+              <a:t>5/12/2025</a:t>
             </a:fld>
             <a:endParaRPr lang="en-US"/>
           </a:p>
@@ -1207,6 +1209,186 @@
     <p:extLst>
       <p:ext uri="{BB962C8B-B14F-4D97-AF65-F5344CB8AC3E}">
         <p14:creationId xmlns:p14="http://schemas.microsoft.com/office/powerpoint/2010/main" val="4262800312"/>
+      </p:ext>
+    </p:extLst>
+  </p:cSld>
+  <p:clrMapOvr>
+    <a:masterClrMapping/>
+  </p:clrMapOvr>
+</p:notes>
+</file>
+
+<file path=ppt/notesSlides/notesSlide17.xml><?xml version="1.0" encoding="utf-8"?>
+<p:notes xmlns:a="http://schemas.openxmlformats.org/drawingml/2006/main" xmlns:r="http://schemas.openxmlformats.org/officeDocument/2006/relationships" xmlns:p="http://schemas.openxmlformats.org/presentationml/2006/main">
+  <p:cSld>
+    <p:spTree>
+      <p:nvGrpSpPr>
+        <p:cNvPr id="1" name=""/>
+        <p:cNvGrpSpPr/>
+        <p:nvPr/>
+      </p:nvGrpSpPr>
+      <p:grpSpPr>
+        <a:xfrm>
+          <a:off x="0" y="0"/>
+          <a:ext cx="0" cy="0"/>
+          <a:chOff x="0" y="0"/>
+          <a:chExt cx="0" cy="0"/>
+        </a:xfrm>
+      </p:grpSpPr>
+      <p:sp>
+        <p:nvSpPr>
+          <p:cNvPr id="2" name="Образ слайда 1"/>
+          <p:cNvSpPr>
+            <a:spLocks noGrp="1" noRot="1" noChangeAspect="1"/>
+          </p:cNvSpPr>
+          <p:nvPr>
+            <p:ph type="sldImg"/>
+          </p:nvPr>
+        </p:nvSpPr>
+        <p:spPr>
+          <a:xfrm>
+            <a:off x="685800" y="1143000"/>
+            <a:ext cx="5486400" cy="3086100"/>
+          </a:xfrm>
+        </p:spPr>
+      </p:sp>
+      <p:sp>
+        <p:nvSpPr>
+          <p:cNvPr id="3" name="Заметки 2"/>
+          <p:cNvSpPr>
+            <a:spLocks noGrp="1"/>
+          </p:cNvSpPr>
+          <p:nvPr>
+            <p:ph type="body" idx="1"/>
+          </p:nvPr>
+        </p:nvSpPr>
+        <p:spPr/>
+        <p:txBody>
+          <a:bodyPr/>
+          <a:lstStyle/>
+          <a:p>
+            <a:endParaRPr lang="ru-RU" dirty="0"/>
+          </a:p>
+        </p:txBody>
+      </p:sp>
+      <p:sp>
+        <p:nvSpPr>
+          <p:cNvPr id="4" name="Номер слайда 3"/>
+          <p:cNvSpPr>
+            <a:spLocks noGrp="1"/>
+          </p:cNvSpPr>
+          <p:nvPr>
+            <p:ph type="sldNum" sz="quarter" idx="10"/>
+          </p:nvPr>
+        </p:nvSpPr>
+        <p:spPr/>
+        <p:txBody>
+          <a:bodyPr/>
+          <a:lstStyle/>
+          <a:p>
+            <a:fld id="{F0F4E2F1-1521-4C3A-A563-2F7D19AB6E0B}" type="slidenum">
+              <a:rPr lang="en-US" smtClean="0"/>
+              <a:pPr/>
+              <a:t>17</a:t>
+            </a:fld>
+            <a:endParaRPr lang="en-US"/>
+          </a:p>
+        </p:txBody>
+      </p:sp>
+    </p:spTree>
+    <p:extLst>
+      <p:ext uri="{BB962C8B-B14F-4D97-AF65-F5344CB8AC3E}">
+        <p14:creationId xmlns:p14="http://schemas.microsoft.com/office/powerpoint/2010/main" val="4157689919"/>
+      </p:ext>
+    </p:extLst>
+  </p:cSld>
+  <p:clrMapOvr>
+    <a:masterClrMapping/>
+  </p:clrMapOvr>
+</p:notes>
+</file>
+
+<file path=ppt/notesSlides/notesSlide18.xml><?xml version="1.0" encoding="utf-8"?>
+<p:notes xmlns:a="http://schemas.openxmlformats.org/drawingml/2006/main" xmlns:r="http://schemas.openxmlformats.org/officeDocument/2006/relationships" xmlns:p="http://schemas.openxmlformats.org/presentationml/2006/main">
+  <p:cSld>
+    <p:spTree>
+      <p:nvGrpSpPr>
+        <p:cNvPr id="1" name=""/>
+        <p:cNvGrpSpPr/>
+        <p:nvPr/>
+      </p:nvGrpSpPr>
+      <p:grpSpPr>
+        <a:xfrm>
+          <a:off x="0" y="0"/>
+          <a:ext cx="0" cy="0"/>
+          <a:chOff x="0" y="0"/>
+          <a:chExt cx="0" cy="0"/>
+        </a:xfrm>
+      </p:grpSpPr>
+      <p:sp>
+        <p:nvSpPr>
+          <p:cNvPr id="2" name="Образ слайда 1"/>
+          <p:cNvSpPr>
+            <a:spLocks noGrp="1" noRot="1" noChangeAspect="1"/>
+          </p:cNvSpPr>
+          <p:nvPr>
+            <p:ph type="sldImg"/>
+          </p:nvPr>
+        </p:nvSpPr>
+        <p:spPr>
+          <a:xfrm>
+            <a:off x="685800" y="1143000"/>
+            <a:ext cx="5486400" cy="3086100"/>
+          </a:xfrm>
+        </p:spPr>
+      </p:sp>
+      <p:sp>
+        <p:nvSpPr>
+          <p:cNvPr id="3" name="Заметки 2"/>
+          <p:cNvSpPr>
+            <a:spLocks noGrp="1"/>
+          </p:cNvSpPr>
+          <p:nvPr>
+            <p:ph type="body" idx="1"/>
+          </p:nvPr>
+        </p:nvSpPr>
+        <p:spPr/>
+        <p:txBody>
+          <a:bodyPr/>
+          <a:lstStyle/>
+          <a:p>
+            <a:endParaRPr lang="ru-RU" dirty="0"/>
+          </a:p>
+        </p:txBody>
+      </p:sp>
+      <p:sp>
+        <p:nvSpPr>
+          <p:cNvPr id="4" name="Номер слайда 3"/>
+          <p:cNvSpPr>
+            <a:spLocks noGrp="1"/>
+          </p:cNvSpPr>
+          <p:nvPr>
+            <p:ph type="sldNum" sz="quarter" idx="10"/>
+          </p:nvPr>
+        </p:nvSpPr>
+        <p:spPr/>
+        <p:txBody>
+          <a:bodyPr/>
+          <a:lstStyle/>
+          <a:p>
+            <a:fld id="{F0F4E2F1-1521-4C3A-A563-2F7D19AB6E0B}" type="slidenum">
+              <a:rPr lang="en-US" smtClean="0"/>
+              <a:pPr/>
+              <a:t>18</a:t>
+            </a:fld>
+            <a:endParaRPr lang="en-US"/>
+          </a:p>
+        </p:txBody>
+      </p:sp>
+    </p:spTree>
+    <p:extLst>
+      <p:ext uri="{BB962C8B-B14F-4D97-AF65-F5344CB8AC3E}">
+        <p14:creationId xmlns:p14="http://schemas.microsoft.com/office/powerpoint/2010/main" val="3223336929"/>
       </p:ext>
     </p:extLst>
   </p:cSld>
@@ -2985,9 +3167,9 @@
                 <a:latin typeface="Bookman Old Style" panose="02050604050505020204" pitchFamily="18" charset="0"/>
                 <a:cs typeface="Times New Roman" panose="02020603050405020304" pitchFamily="18" charset="0"/>
               </a:rPr>
-              <a:t>4 </a:t>
-            </a:r>
-            <a:r>
+              <a:t>4 семестр</a:t>
+            </a:r>
+            <a:br>
               <a:rPr lang="ru-RU" sz="2800" b="1" dirty="0" smtClean="0">
                 <a:solidFill>
                   <a:schemeClr val="tx2">
@@ -2997,10 +3179,9 @@
                 <a:latin typeface="Bookman Old Style" panose="02050604050505020204" pitchFamily="18" charset="0"/>
                 <a:cs typeface="Times New Roman" panose="02020603050405020304" pitchFamily="18" charset="0"/>
               </a:rPr>
-              <a:t>семестр</a:t>
-            </a:r>
-            <a:br>
-              <a:rPr lang="ru-RU" sz="2800" b="1" dirty="0" smtClean="0">
+            </a:br>
+            <a:r>
+              <a:rPr lang="ru-RU" sz="2800" b="1" smtClean="0">
                 <a:solidFill>
                   <a:schemeClr val="tx2">
                     <a:lumMod val="50000"/>
@@ -3009,30 +3190,7 @@
                 <a:latin typeface="Bookman Old Style" panose="02050604050505020204" pitchFamily="18" charset="0"/>
                 <a:cs typeface="Times New Roman" panose="02020603050405020304" pitchFamily="18" charset="0"/>
               </a:rPr>
-            </a:br>
-            <a:r>
-              <a:rPr lang="ru-RU" sz="2800" b="1" smtClean="0">
-                <a:solidFill>
-                  <a:schemeClr val="tx2">
-                    <a:lumMod val="50000"/>
-                  </a:schemeClr>
-                </a:solidFill>
-                <a:latin typeface="Bookman Old Style" panose="02050604050505020204" pitchFamily="18" charset="0"/>
-                <a:cs typeface="Times New Roman" panose="02020603050405020304" pitchFamily="18" charset="0"/>
-              </a:rPr>
-              <a:t>Лекция </a:t>
-            </a:r>
-            <a:r>
-              <a:rPr lang="ru-RU" sz="2800" b="1" smtClean="0">
-                <a:solidFill>
-                  <a:schemeClr val="tx2">
-                    <a:lumMod val="50000"/>
-                  </a:schemeClr>
-                </a:solidFill>
-                <a:latin typeface="Bookman Old Style" panose="02050604050505020204" pitchFamily="18" charset="0"/>
-                <a:cs typeface="Times New Roman" panose="02020603050405020304" pitchFamily="18" charset="0"/>
-              </a:rPr>
-              <a:t>7. </a:t>
+              <a:t>Лекция 7. </a:t>
             </a:r>
             <a:r>
               <a:rPr lang="en-US" sz="2800" b="1" dirty="0" smtClean="0">
@@ -8145,6 +8303,550 @@
     <p:extLst>
       <p:ext uri="{BB962C8B-B14F-4D97-AF65-F5344CB8AC3E}">
         <p14:creationId xmlns:p14="http://schemas.microsoft.com/office/powerpoint/2010/main" val="625040734"/>
+      </p:ext>
+    </p:extLst>
+  </p:cSld>
+  <p:clrMapOvr>
+    <a:masterClrMapping/>
+  </p:clrMapOvr>
+  <p:timing>
+    <p:tnLst>
+      <p:par>
+        <p:cTn id="1" dur="indefinite" restart="never" nodeType="tmRoot"/>
+      </p:par>
+    </p:tnLst>
+  </p:timing>
+</p:sld>
+</file>
+
+<file path=ppt/slides/slide17.xml><?xml version="1.0" encoding="utf-8"?>
+<p:sld xmlns:a="http://schemas.openxmlformats.org/drawingml/2006/main" xmlns:r="http://schemas.openxmlformats.org/officeDocument/2006/relationships" xmlns:p="http://schemas.openxmlformats.org/presentationml/2006/main">
+  <p:cSld>
+    <p:spTree>
+      <p:nvGrpSpPr>
+        <p:cNvPr id="1" name=""/>
+        <p:cNvGrpSpPr/>
+        <p:nvPr/>
+      </p:nvGrpSpPr>
+      <p:grpSpPr>
+        <a:xfrm>
+          <a:off x="0" y="0"/>
+          <a:ext cx="0" cy="0"/>
+          <a:chOff x="0" y="0"/>
+          <a:chExt cx="0" cy="0"/>
+        </a:xfrm>
+      </p:grpSpPr>
+      <p:sp>
+        <p:nvSpPr>
+          <p:cNvPr id="7" name="Rectangle 1"/>
+          <p:cNvSpPr>
+            <a:spLocks noChangeArrowheads="1"/>
+          </p:cNvSpPr>
+          <p:nvPr/>
+        </p:nvSpPr>
+        <p:spPr bwMode="auto">
+          <a:xfrm>
+            <a:off x="963944" y="6472639"/>
+            <a:ext cx="184731" cy="830997"/>
+          </a:xfrm>
+          <a:prstGeom prst="rect">
+            <a:avLst/>
+          </a:prstGeom>
+          <a:noFill/>
+          <a:ln>
+            <a:noFill/>
+          </a:ln>
+          <a:effectLst/>
+          <a:extLst>
+            <a:ext uri="{909E8E84-426E-40DD-AFC4-6F175D3DCCD1}">
+              <a14:hiddenFill xmlns:a14="http://schemas.microsoft.com/office/drawing/2010/main">
+                <a:solidFill>
+                  <a:schemeClr val="accent1"/>
+                </a:solidFill>
+              </a14:hiddenFill>
+            </a:ext>
+            <a:ext uri="{91240B29-F687-4F45-9708-019B960494DF}">
+              <a14:hiddenLine xmlns:a14="http://schemas.microsoft.com/office/drawing/2010/main" w="9525">
+                <a:solidFill>
+                  <a:schemeClr val="tx1"/>
+                </a:solidFill>
+                <a:miter lim="800000"/>
+                <a:headEnd/>
+                <a:tailEnd/>
+              </a14:hiddenLine>
+            </a:ext>
+            <a:ext uri="{AF507438-7753-43E0-B8FC-AC1667EBCBE1}">
+              <a14:hiddenEffects xmlns:a14="http://schemas.microsoft.com/office/drawing/2010/main">
+                <a:effectLst>
+                  <a:outerShdw dist="35921" dir="2700000" algn="ctr" rotWithShape="0">
+                    <a:schemeClr val="bg2"/>
+                  </a:outerShdw>
+                </a:effectLst>
+              </a14:hiddenEffects>
+            </a:ext>
+          </a:extLst>
+        </p:spPr>
+        <p:txBody>
+          <a:bodyPr vert="horz" wrap="none" lIns="91440" tIns="45720" rIns="91440" bIns="45720" numCol="1" anchor="ctr" anchorCtr="0" compatLnSpc="1">
+            <a:prstTxWarp prst="textNoShape">
+              <a:avLst/>
+            </a:prstTxWarp>
+            <a:spAutoFit/>
+          </a:bodyPr>
+          <a:lstStyle/>
+          <a:p>
+            <a:pPr marL="0" marR="0" lvl="0" indent="0" algn="l" defTabSz="914400" rtl="0" eaLnBrk="0" fontAlgn="base" latinLnBrk="0" hangingPunct="0">
+              <a:lnSpc>
+                <a:spcPct val="100000"/>
+              </a:lnSpc>
+              <a:spcBef>
+                <a:spcPct val="0"/>
+              </a:spcBef>
+              <a:spcAft>
+                <a:spcPct val="0"/>
+              </a:spcAft>
+              <a:buClrTx/>
+              <a:buSzTx/>
+              <a:buFontTx/>
+              <a:buNone/>
+              <a:tabLst/>
+            </a:pPr>
+            <a:r>
+              <a:rPr kumimoji="0" lang="ru-RU" altLang="ru-RU" sz="2400" b="0" i="0" u="none" strike="noStrike" cap="none" normalizeH="0" baseline="0" smtClean="0">
+                <a:ln>
+                  <a:noFill/>
+                </a:ln>
+                <a:solidFill>
+                  <a:schemeClr val="tx1"/>
+                </a:solidFill>
+                <a:effectLst/>
+                <a:latin typeface="Arial" panose="020B0604020202020204" pitchFamily="34" charset="0"/>
+              </a:rPr>
+              <a:t/>
+            </a:r>
+            <a:br>
+              <a:rPr kumimoji="0" lang="ru-RU" altLang="ru-RU" sz="2400" b="0" i="0" u="none" strike="noStrike" cap="none" normalizeH="0" baseline="0" smtClean="0">
+                <a:ln>
+                  <a:noFill/>
+                </a:ln>
+                <a:solidFill>
+                  <a:schemeClr val="tx1"/>
+                </a:solidFill>
+                <a:effectLst/>
+                <a:latin typeface="Arial" panose="020B0604020202020204" pitchFamily="34" charset="0"/>
+              </a:rPr>
+            </a:br>
+            <a:endParaRPr kumimoji="0" lang="ru-RU" altLang="ru-RU" sz="2400" b="0" i="0" u="none" strike="noStrike" cap="none" normalizeH="0" baseline="0" smtClean="0">
+              <a:ln>
+                <a:noFill/>
+              </a:ln>
+              <a:solidFill>
+                <a:schemeClr val="tx1"/>
+              </a:solidFill>
+              <a:effectLst/>
+              <a:latin typeface="Arial" panose="020B0604020202020204" pitchFamily="34" charset="0"/>
+            </a:endParaRPr>
+          </a:p>
+        </p:txBody>
+      </p:sp>
+      <p:sp>
+        <p:nvSpPr>
+          <p:cNvPr id="3" name="Прямоугольник 2"/>
+          <p:cNvSpPr/>
+          <p:nvPr/>
+        </p:nvSpPr>
+        <p:spPr>
+          <a:xfrm>
+            <a:off x="0" y="0"/>
+            <a:ext cx="12192000" cy="3416320"/>
+          </a:xfrm>
+          <a:prstGeom prst="rect">
+            <a:avLst/>
+          </a:prstGeom>
+        </p:spPr>
+        <p:txBody>
+          <a:bodyPr wrap="square">
+            <a:spAutoFit/>
+          </a:bodyPr>
+          <a:lstStyle/>
+          <a:p>
+            <a:pPr algn="just"/>
+            <a:endParaRPr lang="ru-RU" sz="2400" dirty="0" smtClean="0">
+              <a:latin typeface="Bookman Old Style" panose="02050604050505020204" pitchFamily="18" charset="0"/>
+            </a:endParaRPr>
+          </a:p>
+          <a:p>
+            <a:pPr algn="ctr"/>
+            <a:r>
+              <a:rPr lang="ru-RU" sz="2400" b="1" dirty="0" smtClean="0">
+                <a:latin typeface="Bookman Old Style" panose="02050604050505020204" pitchFamily="18" charset="0"/>
+              </a:rPr>
+              <a:t>Темы для самостоятельного изучения</a:t>
+            </a:r>
+          </a:p>
+          <a:p>
+            <a:pPr algn="just"/>
+            <a:r>
+              <a:rPr lang="ru-RU" sz="2400" b="1" dirty="0" smtClean="0">
+                <a:latin typeface="Bookman Old Style" panose="02050604050505020204" pitchFamily="18" charset="0"/>
+              </a:rPr>
+              <a:t>Рефлексия: </a:t>
+            </a:r>
+            <a:r>
+              <a:rPr lang="it-IT" sz="2400" dirty="0" smtClean="0">
+                <a:latin typeface="Bookman Old Style" panose="02050604050505020204" pitchFamily="18" charset="0"/>
+                <a:hlinkClick r:id="rId3"/>
+              </a:rPr>
+              <a:t>https</a:t>
+            </a:r>
+            <a:r>
+              <a:rPr lang="it-IT" sz="2400" dirty="0">
+                <a:latin typeface="Bookman Old Style" panose="02050604050505020204" pitchFamily="18" charset="0"/>
+                <a:hlinkClick r:id="rId3"/>
+              </a:rPr>
+              <a:t>://</a:t>
+            </a:r>
+            <a:r>
+              <a:rPr lang="it-IT" sz="2400" dirty="0" smtClean="0">
+                <a:latin typeface="Bookman Old Style" panose="02050604050505020204" pitchFamily="18" charset="0"/>
+                <a:hlinkClick r:id="rId3"/>
+              </a:rPr>
+              <a:t>metanit.com/sharp/tutorial/14.1.php</a:t>
+            </a:r>
+            <a:endParaRPr lang="ru-RU" sz="2400" dirty="0" smtClean="0">
+              <a:latin typeface="Bookman Old Style" panose="02050604050505020204" pitchFamily="18" charset="0"/>
+            </a:endParaRPr>
+          </a:p>
+          <a:p>
+            <a:pPr algn="just"/>
+            <a:r>
+              <a:rPr lang="ru-RU" sz="2400" b="1" dirty="0" smtClean="0">
+                <a:latin typeface="Bookman Old Style" panose="02050604050505020204" pitchFamily="18" charset="0"/>
+              </a:rPr>
+              <a:t>Управление памятью: </a:t>
+            </a:r>
+            <a:r>
+              <a:rPr lang="en-US" sz="2400" dirty="0">
+                <a:latin typeface="Bookman Old Style" panose="02050604050505020204" pitchFamily="18" charset="0"/>
+                <a:hlinkClick r:id="rId4"/>
+              </a:rPr>
+              <a:t>https://</a:t>
+            </a:r>
+            <a:r>
+              <a:rPr lang="en-US" sz="2400" dirty="0" smtClean="0">
+                <a:latin typeface="Bookman Old Style" panose="02050604050505020204" pitchFamily="18" charset="0"/>
+                <a:hlinkClick r:id="rId4"/>
+              </a:rPr>
+              <a:t>metanit.com/sharp/tutorial/8.1.php</a:t>
+            </a:r>
+            <a:endParaRPr lang="ru-RU" sz="2400" dirty="0" smtClean="0">
+              <a:latin typeface="Bookman Old Style" panose="02050604050505020204" pitchFamily="18" charset="0"/>
+            </a:endParaRPr>
+          </a:p>
+          <a:p>
+            <a:pPr algn="just"/>
+            <a:r>
+              <a:rPr lang="ru-RU" sz="2400" b="1" dirty="0" smtClean="0">
+                <a:latin typeface="Bookman Old Style" panose="02050604050505020204" pitchFamily="18" charset="0"/>
+              </a:rPr>
+              <a:t>Клиент-серверные приложения: </a:t>
+            </a:r>
+            <a:r>
+              <a:rPr lang="en-US" sz="2400" dirty="0">
+                <a:latin typeface="Bookman Old Style" panose="02050604050505020204" pitchFamily="18" charset="0"/>
+                <a:hlinkClick r:id="rId5"/>
+              </a:rPr>
+              <a:t>https://</a:t>
+            </a:r>
+            <a:r>
+              <a:rPr lang="en-US" sz="2400" dirty="0" smtClean="0">
+                <a:latin typeface="Bookman Old Style" panose="02050604050505020204" pitchFamily="18" charset="0"/>
+                <a:hlinkClick r:id="rId5"/>
+              </a:rPr>
+              <a:t>metanit.com/sharp/net/3.4.php</a:t>
+            </a:r>
+            <a:endParaRPr lang="ru-RU" sz="2400" dirty="0" smtClean="0">
+              <a:latin typeface="Bookman Old Style" panose="02050604050505020204" pitchFamily="18" charset="0"/>
+            </a:endParaRPr>
+          </a:p>
+          <a:p>
+            <a:pPr algn="just"/>
+            <a:r>
+              <a:rPr lang="en-US" sz="2400" b="1" dirty="0" smtClean="0">
+                <a:latin typeface="Bookman Old Style" panose="02050604050505020204" pitchFamily="18" charset="0"/>
+              </a:rPr>
+              <a:t>Web </a:t>
+            </a:r>
+            <a:r>
+              <a:rPr lang="ru-RU" sz="2400" b="1" dirty="0" smtClean="0">
+                <a:latin typeface="Bookman Old Style" panose="02050604050505020204" pitchFamily="18" charset="0"/>
+              </a:rPr>
+              <a:t>приложения: </a:t>
+            </a:r>
+            <a:r>
+              <a:rPr lang="en-US" sz="2400" dirty="0">
+                <a:latin typeface="Bookman Old Style" panose="02050604050505020204" pitchFamily="18" charset="0"/>
+                <a:hlinkClick r:id="rId6"/>
+              </a:rPr>
+              <a:t>https://</a:t>
+            </a:r>
+            <a:r>
+              <a:rPr lang="en-US" sz="2400" dirty="0" smtClean="0">
+                <a:latin typeface="Bookman Old Style" panose="02050604050505020204" pitchFamily="18" charset="0"/>
+                <a:hlinkClick r:id="rId6"/>
+              </a:rPr>
+              <a:t>metanit.com/sharp/aspnet6/1.1.php</a:t>
+            </a:r>
+            <a:r>
+              <a:rPr lang="ru-RU" sz="2400" dirty="0" smtClean="0">
+                <a:latin typeface="Bookman Old Style" panose="02050604050505020204" pitchFamily="18" charset="0"/>
+              </a:rPr>
+              <a:t>   </a:t>
+            </a:r>
+            <a:endParaRPr lang="en-US" sz="2400" dirty="0" smtClean="0">
+              <a:latin typeface="Bookman Old Style" panose="02050604050505020204" pitchFamily="18" charset="0"/>
+            </a:endParaRPr>
+          </a:p>
+          <a:p>
+            <a:pPr algn="just"/>
+            <a:endParaRPr lang="en-US" sz="2400" b="0" dirty="0">
+              <a:effectLst/>
+              <a:latin typeface="Bookman Old Style" panose="02050604050505020204" pitchFamily="18" charset="0"/>
+            </a:endParaRPr>
+          </a:p>
+          <a:p>
+            <a:pPr algn="ctr"/>
+            <a:r>
+              <a:rPr lang="ru-RU" sz="2400" b="1" dirty="0" smtClean="0">
+                <a:latin typeface="Bookman Old Style" panose="02050604050505020204" pitchFamily="18" charset="0"/>
+              </a:rPr>
+              <a:t>Бесплатные курсы по программированию</a:t>
+            </a:r>
+          </a:p>
+          <a:p>
+            <a:pPr algn="just"/>
+            <a:r>
+              <a:rPr lang="it-IT" sz="2400" dirty="0">
+                <a:latin typeface="Bookman Old Style" panose="02050604050505020204" pitchFamily="18" charset="0"/>
+                <a:hlinkClick r:id="rId7"/>
+              </a:rPr>
+              <a:t>https://ulearn.me</a:t>
+            </a:r>
+            <a:r>
+              <a:rPr lang="it-IT" sz="2400" dirty="0" smtClean="0">
+                <a:latin typeface="Bookman Old Style" panose="02050604050505020204" pitchFamily="18" charset="0"/>
+                <a:hlinkClick r:id="rId7"/>
+              </a:rPr>
+              <a:t>/</a:t>
+            </a:r>
+            <a:r>
+              <a:rPr lang="ru-RU" sz="2400" dirty="0" smtClean="0">
+                <a:latin typeface="Bookman Old Style" panose="02050604050505020204" pitchFamily="18" charset="0"/>
+              </a:rPr>
+              <a:t> </a:t>
+            </a:r>
+            <a:endParaRPr lang="it-IT" sz="2400" b="0" dirty="0">
+              <a:effectLst/>
+              <a:latin typeface="Bookman Old Style" panose="02050604050505020204" pitchFamily="18" charset="0"/>
+            </a:endParaRPr>
+          </a:p>
+        </p:txBody>
+      </p:sp>
+    </p:spTree>
+    <p:extLst>
+      <p:ext uri="{BB962C8B-B14F-4D97-AF65-F5344CB8AC3E}">
+        <p14:creationId xmlns:p14="http://schemas.microsoft.com/office/powerpoint/2010/main" val="1743313510"/>
+      </p:ext>
+    </p:extLst>
+  </p:cSld>
+  <p:clrMapOvr>
+    <a:masterClrMapping/>
+  </p:clrMapOvr>
+  <p:timing>
+    <p:tnLst>
+      <p:par>
+        <p:cTn id="1" dur="indefinite" restart="never" nodeType="tmRoot"/>
+      </p:par>
+    </p:tnLst>
+  </p:timing>
+</p:sld>
+</file>
+
+<file path=ppt/slides/slide18.xml><?xml version="1.0" encoding="utf-8"?>
+<p:sld xmlns:a="http://schemas.openxmlformats.org/drawingml/2006/main" xmlns:r="http://schemas.openxmlformats.org/officeDocument/2006/relationships" xmlns:p="http://schemas.openxmlformats.org/presentationml/2006/main">
+  <p:cSld>
+    <p:spTree>
+      <p:nvGrpSpPr>
+        <p:cNvPr id="1" name=""/>
+        <p:cNvGrpSpPr/>
+        <p:nvPr/>
+      </p:nvGrpSpPr>
+      <p:grpSpPr>
+        <a:xfrm>
+          <a:off x="0" y="0"/>
+          <a:ext cx="0" cy="0"/>
+          <a:chOff x="0" y="0"/>
+          <a:chExt cx="0" cy="0"/>
+        </a:xfrm>
+      </p:grpSpPr>
+      <p:sp>
+        <p:nvSpPr>
+          <p:cNvPr id="7" name="Rectangle 1"/>
+          <p:cNvSpPr>
+            <a:spLocks noChangeArrowheads="1"/>
+          </p:cNvSpPr>
+          <p:nvPr/>
+        </p:nvSpPr>
+        <p:spPr bwMode="auto">
+          <a:xfrm>
+            <a:off x="963944" y="6472639"/>
+            <a:ext cx="184731" cy="830997"/>
+          </a:xfrm>
+          <a:prstGeom prst="rect">
+            <a:avLst/>
+          </a:prstGeom>
+          <a:noFill/>
+          <a:ln>
+            <a:noFill/>
+          </a:ln>
+          <a:effectLst/>
+          <a:extLst>
+            <a:ext uri="{909E8E84-426E-40DD-AFC4-6F175D3DCCD1}">
+              <a14:hiddenFill xmlns:a14="http://schemas.microsoft.com/office/drawing/2010/main">
+                <a:solidFill>
+                  <a:schemeClr val="accent1"/>
+                </a:solidFill>
+              </a14:hiddenFill>
+            </a:ext>
+            <a:ext uri="{91240B29-F687-4F45-9708-019B960494DF}">
+              <a14:hiddenLine xmlns:a14="http://schemas.microsoft.com/office/drawing/2010/main" w="9525">
+                <a:solidFill>
+                  <a:schemeClr val="tx1"/>
+                </a:solidFill>
+                <a:miter lim="800000"/>
+                <a:headEnd/>
+                <a:tailEnd/>
+              </a14:hiddenLine>
+            </a:ext>
+            <a:ext uri="{AF507438-7753-43E0-B8FC-AC1667EBCBE1}">
+              <a14:hiddenEffects xmlns:a14="http://schemas.microsoft.com/office/drawing/2010/main">
+                <a:effectLst>
+                  <a:outerShdw dist="35921" dir="2700000" algn="ctr" rotWithShape="0">
+                    <a:schemeClr val="bg2"/>
+                  </a:outerShdw>
+                </a:effectLst>
+              </a14:hiddenEffects>
+            </a:ext>
+          </a:extLst>
+        </p:spPr>
+        <p:txBody>
+          <a:bodyPr vert="horz" wrap="none" lIns="91440" tIns="45720" rIns="91440" bIns="45720" numCol="1" anchor="ctr" anchorCtr="0" compatLnSpc="1">
+            <a:prstTxWarp prst="textNoShape">
+              <a:avLst/>
+            </a:prstTxWarp>
+            <a:spAutoFit/>
+          </a:bodyPr>
+          <a:lstStyle/>
+          <a:p>
+            <a:pPr marL="0" marR="0" lvl="0" indent="0" algn="l" defTabSz="914400" rtl="0" eaLnBrk="0" fontAlgn="base" latinLnBrk="0" hangingPunct="0">
+              <a:lnSpc>
+                <a:spcPct val="100000"/>
+              </a:lnSpc>
+              <a:spcBef>
+                <a:spcPct val="0"/>
+              </a:spcBef>
+              <a:spcAft>
+                <a:spcPct val="0"/>
+              </a:spcAft>
+              <a:buClrTx/>
+              <a:buSzTx/>
+              <a:buFontTx/>
+              <a:buNone/>
+              <a:tabLst/>
+            </a:pPr>
+            <a:r>
+              <a:rPr kumimoji="0" lang="ru-RU" altLang="ru-RU" sz="2400" b="0" i="0" u="none" strike="noStrike" cap="none" normalizeH="0" baseline="0" smtClean="0">
+                <a:ln>
+                  <a:noFill/>
+                </a:ln>
+                <a:solidFill>
+                  <a:schemeClr val="tx1"/>
+                </a:solidFill>
+                <a:effectLst/>
+                <a:latin typeface="Arial" panose="020B0604020202020204" pitchFamily="34" charset="0"/>
+              </a:rPr>
+              <a:t/>
+            </a:r>
+            <a:br>
+              <a:rPr kumimoji="0" lang="ru-RU" altLang="ru-RU" sz="2400" b="0" i="0" u="none" strike="noStrike" cap="none" normalizeH="0" baseline="0" smtClean="0">
+                <a:ln>
+                  <a:noFill/>
+                </a:ln>
+                <a:solidFill>
+                  <a:schemeClr val="tx1"/>
+                </a:solidFill>
+                <a:effectLst/>
+                <a:latin typeface="Arial" panose="020B0604020202020204" pitchFamily="34" charset="0"/>
+              </a:rPr>
+            </a:br>
+            <a:endParaRPr kumimoji="0" lang="ru-RU" altLang="ru-RU" sz="2400" b="0" i="0" u="none" strike="noStrike" cap="none" normalizeH="0" baseline="0" smtClean="0">
+              <a:ln>
+                <a:noFill/>
+              </a:ln>
+              <a:solidFill>
+                <a:schemeClr val="tx1"/>
+              </a:solidFill>
+              <a:effectLst/>
+              <a:latin typeface="Arial" panose="020B0604020202020204" pitchFamily="34" charset="0"/>
+            </a:endParaRPr>
+          </a:p>
+        </p:txBody>
+      </p:sp>
+      <p:pic>
+        <p:nvPicPr>
+          <p:cNvPr id="9218" name="Picture 2" descr="Ералаш конец картинка - 65 фото"/>
+          <p:cNvPicPr>
+            <a:picLocks noChangeAspect="1" noChangeArrowheads="1"/>
+          </p:cNvPicPr>
+          <p:nvPr/>
+        </p:nvPicPr>
+        <p:blipFill>
+          <a:blip r:embed="rId3">
+            <a:extLst>
+              <a:ext uri="{28A0092B-C50C-407E-A947-70E740481C1C}">
+                <a14:useLocalDpi xmlns:a14="http://schemas.microsoft.com/office/drawing/2010/main" val="0"/>
+              </a:ext>
+            </a:extLst>
+          </a:blip>
+          <a:srcRect/>
+          <a:stretch>
+            <a:fillRect/>
+          </a:stretch>
+        </p:blipFill>
+        <p:spPr bwMode="auto">
+          <a:xfrm>
+            <a:off x="0" y="-1"/>
+            <a:ext cx="12192000" cy="6858001"/>
+          </a:xfrm>
+          <a:prstGeom prst="rect">
+            <a:avLst/>
+          </a:prstGeom>
+          <a:noFill/>
+          <a:extLst>
+            <a:ext uri="{909E8E84-426E-40DD-AFC4-6F175D3DCCD1}">
+              <a14:hiddenFill xmlns:a14="http://schemas.microsoft.com/office/drawing/2010/main">
+                <a:solidFill>
+                  <a:srgbClr val="FFFFFF"/>
+                </a:solidFill>
+              </a14:hiddenFill>
+            </a:ext>
+          </a:extLst>
+        </p:spPr>
+      </p:pic>
+    </p:spTree>
+    <p:extLst>
+      <p:ext uri="{BB962C8B-B14F-4D97-AF65-F5344CB8AC3E}">
+        <p14:creationId xmlns:p14="http://schemas.microsoft.com/office/powerpoint/2010/main" val="740295566"/>
       </p:ext>
     </p:extLst>
   </p:cSld>

</xml_diff>